<commit_message>
- Ajout de la présentation PPT - Mise à jour des jsp
</commit_message>
<xml_diff>
--- a/projet-3/docs/Présentation_site_escalade.pptx
+++ b/projet-3/docs/Présentation_site_escalade.pptx
@@ -15,7 +15,6 @@
     <p:sldId id="261" r:id="rId9"/>
     <p:sldId id="268" r:id="rId10"/>
     <p:sldId id="269" r:id="rId11"/>
-    <p:sldId id="263" r:id="rId12"/>
   </p:sldIdLst>
   <p:sldSz cx="12192000" cy="6858000"/>
   <p:notesSz cx="6858000" cy="9144000"/>
@@ -3130,11 +3129,6 @@
               </a:rPr>
               <a:t>Démonstration</a:t>
             </a:r>
-            <a:endParaRPr lang="fr-FR" b="1" dirty="0">
-              <a:solidFill>
-                <a:srgbClr val="FFFFFF"/>
-              </a:solidFill>
-            </a:endParaRPr>
           </a:p>
         </p:txBody>
       </p:sp>
@@ -3210,101 +3204,6 @@
     <p:extLst>
       <p:ext uri="{BB962C8B-B14F-4D97-AF65-F5344CB8AC3E}">
         <p14:creationId xmlns:p14="http://schemas.microsoft.com/office/powerpoint/2010/main" val="1419311990"/>
-      </p:ext>
-    </p:extLst>
-  </p:cSld>
-  <p:clrMapOvr>
-    <a:masterClrMapping/>
-  </p:clrMapOvr>
-  <p:timing>
-    <p:tnLst>
-      <p:par>
-        <p:cTn id="1" dur="indefinite" restart="never" nodeType="tmRoot"/>
-      </p:par>
-    </p:tnLst>
-  </p:timing>
-</p:sld>
-</file>
-
-<file path=ppt/slides/slide11.xml><?xml version="1.0" encoding="utf-8"?>
-<p:sld xmlns:a="http://schemas.openxmlformats.org/drawingml/2006/main" xmlns:r="http://schemas.openxmlformats.org/officeDocument/2006/relationships" xmlns:p="http://schemas.openxmlformats.org/presentationml/2006/main">
-  <p:cSld>
-    <p:bg>
-      <p:bgPr>
-        <a:solidFill>
-          <a:srgbClr val="333E50"/>
-        </a:solidFill>
-        <a:effectLst/>
-      </p:bgPr>
-    </p:bg>
-    <p:spTree>
-      <p:nvGrpSpPr>
-        <p:cNvPr id="1" name=""/>
-        <p:cNvGrpSpPr/>
-        <p:nvPr/>
-      </p:nvGrpSpPr>
-      <p:grpSpPr>
-        <a:xfrm>
-          <a:off x="0" y="0"/>
-          <a:ext cx="0" cy="0"/>
-          <a:chOff x="0" y="0"/>
-          <a:chExt cx="0" cy="0"/>
-        </a:xfrm>
-      </p:grpSpPr>
-      <p:sp>
-        <p:nvSpPr>
-          <p:cNvPr id="2" name="Titre 1"/>
-          <p:cNvSpPr>
-            <a:spLocks noGrp="1"/>
-          </p:cNvSpPr>
-          <p:nvPr>
-            <p:ph type="title"/>
-          </p:nvPr>
-        </p:nvSpPr>
-        <p:spPr/>
-        <p:txBody>
-          <a:bodyPr/>
-          <a:lstStyle/>
-          <a:p>
-            <a:r>
-              <a:rPr lang="fr-FR" b="1" dirty="0" smtClean="0">
-                <a:solidFill>
-                  <a:srgbClr val="FFFFFF"/>
-                </a:solidFill>
-              </a:rPr>
-              <a:t>Conclusion</a:t>
-            </a:r>
-            <a:endParaRPr lang="fr-FR" b="1" dirty="0">
-              <a:solidFill>
-                <a:srgbClr val="FFFFFF"/>
-              </a:solidFill>
-            </a:endParaRPr>
-          </a:p>
-        </p:txBody>
-      </p:sp>
-      <p:sp>
-        <p:nvSpPr>
-          <p:cNvPr id="3" name="Espace réservé du contenu 2"/>
-          <p:cNvSpPr>
-            <a:spLocks noGrp="1"/>
-          </p:cNvSpPr>
-          <p:nvPr>
-            <p:ph idx="1"/>
-          </p:nvPr>
-        </p:nvSpPr>
-        <p:spPr/>
-        <p:txBody>
-          <a:bodyPr/>
-          <a:lstStyle/>
-          <a:p>
-            <a:endParaRPr lang="fr-FR"/>
-          </a:p>
-        </p:txBody>
-      </p:sp>
-    </p:spTree>
-    <p:extLst>
-      <p:ext uri="{BB962C8B-B14F-4D97-AF65-F5344CB8AC3E}">
-        <p14:creationId xmlns:p14="http://schemas.microsoft.com/office/powerpoint/2010/main" val="3961285589"/>
       </p:ext>
     </p:extLst>
   </p:cSld>
@@ -4360,11 +4259,6 @@
               </a:rPr>
               <a:t> et cryptage des données</a:t>
             </a:r>
-            <a:endParaRPr lang="fr-FR" b="1" dirty="0">
-              <a:solidFill>
-                <a:srgbClr val="FFFFFF"/>
-              </a:solidFill>
-            </a:endParaRPr>
           </a:p>
         </p:txBody>
       </p:sp>
@@ -4398,11 +4292,6 @@
               </a:rPr>
               <a:t>Vérification des droits</a:t>
             </a:r>
-            <a:endParaRPr lang="fr-FR" sz="4000" dirty="0" smtClean="0">
-              <a:solidFill>
-                <a:srgbClr val="FFFFFF"/>
-              </a:solidFill>
-            </a:endParaRPr>
           </a:p>
           <a:p>
             <a:endParaRPr lang="fr-FR" sz="4000" dirty="0" smtClean="0">

</xml_diff>

<commit_message>
- Mise à jour de la présentation powerPoint - Corrections bugs
</commit_message>
<xml_diff>
--- a/projet-3/docs/Présentation_site_escalade.pptx
+++ b/projet-3/docs/Présentation_site_escalade.pptx
@@ -4,6 +4,9 @@
   <p:sldMasterIdLst>
     <p:sldMasterId id="2147483648" r:id="rId1"/>
   </p:sldMasterIdLst>
+  <p:notesMasterIdLst>
+    <p:notesMasterId r:id="rId12"/>
+  </p:notesMasterIdLst>
   <p:sldIdLst>
     <p:sldId id="256" r:id="rId2"/>
     <p:sldId id="257" r:id="rId3"/>
@@ -121,6 +124,1655 @@
 </p:presentation>
 </file>
 
+<file path=ppt/notesMasters/notesMaster1.xml><?xml version="1.0" encoding="utf-8"?>
+<p:notesMaster xmlns:a="http://schemas.openxmlformats.org/drawingml/2006/main" xmlns:r="http://schemas.openxmlformats.org/officeDocument/2006/relationships" xmlns:p="http://schemas.openxmlformats.org/presentationml/2006/main">
+  <p:cSld>
+    <p:bg>
+      <p:bgRef idx="1001">
+        <a:schemeClr val="bg1"/>
+      </p:bgRef>
+    </p:bg>
+    <p:spTree>
+      <p:nvGrpSpPr>
+        <p:cNvPr id="1" name=""/>
+        <p:cNvGrpSpPr/>
+        <p:nvPr/>
+      </p:nvGrpSpPr>
+      <p:grpSpPr>
+        <a:xfrm>
+          <a:off x="0" y="0"/>
+          <a:ext cx="0" cy="0"/>
+          <a:chOff x="0" y="0"/>
+          <a:chExt cx="0" cy="0"/>
+        </a:xfrm>
+      </p:grpSpPr>
+      <p:sp>
+        <p:nvSpPr>
+          <p:cNvPr id="2" name="Espace réservé de l'en-tête 1"/>
+          <p:cNvSpPr>
+            <a:spLocks noGrp="1"/>
+          </p:cNvSpPr>
+          <p:nvPr>
+            <p:ph type="hdr" sz="quarter"/>
+          </p:nvPr>
+        </p:nvSpPr>
+        <p:spPr>
+          <a:xfrm>
+            <a:off x="0" y="0"/>
+            <a:ext cx="2971800" cy="458788"/>
+          </a:xfrm>
+          <a:prstGeom prst="rect">
+            <a:avLst/>
+          </a:prstGeom>
+        </p:spPr>
+        <p:txBody>
+          <a:bodyPr vert="horz" lIns="91440" tIns="45720" rIns="91440" bIns="45720" rtlCol="0"/>
+          <a:lstStyle>
+            <a:lvl1pPr algn="l">
+              <a:defRPr sz="1200"/>
+            </a:lvl1pPr>
+          </a:lstStyle>
+          <a:p>
+            <a:endParaRPr lang="fr-FR"/>
+          </a:p>
+        </p:txBody>
+      </p:sp>
+      <p:sp>
+        <p:nvSpPr>
+          <p:cNvPr id="3" name="Espace réservé de la date 2"/>
+          <p:cNvSpPr>
+            <a:spLocks noGrp="1"/>
+          </p:cNvSpPr>
+          <p:nvPr>
+            <p:ph type="dt" idx="1"/>
+          </p:nvPr>
+        </p:nvSpPr>
+        <p:spPr>
+          <a:xfrm>
+            <a:off x="3884613" y="0"/>
+            <a:ext cx="2971800" cy="458788"/>
+          </a:xfrm>
+          <a:prstGeom prst="rect">
+            <a:avLst/>
+          </a:prstGeom>
+        </p:spPr>
+        <p:txBody>
+          <a:bodyPr vert="horz" lIns="91440" tIns="45720" rIns="91440" bIns="45720" rtlCol="0"/>
+          <a:lstStyle>
+            <a:lvl1pPr algn="r">
+              <a:defRPr sz="1200"/>
+            </a:lvl1pPr>
+          </a:lstStyle>
+          <a:p>
+            <a:fld id="{25F98C3A-5897-45F4-8091-C479AAEBF033}" type="datetimeFigureOut">
+              <a:rPr lang="fr-FR" smtClean="0"/>
+              <a:t>21/11/2018</a:t>
+            </a:fld>
+            <a:endParaRPr lang="fr-FR"/>
+          </a:p>
+        </p:txBody>
+      </p:sp>
+      <p:sp>
+        <p:nvSpPr>
+          <p:cNvPr id="4" name="Espace réservé de l'image des diapositives 3"/>
+          <p:cNvSpPr>
+            <a:spLocks noGrp="1" noRot="1" noChangeAspect="1"/>
+          </p:cNvSpPr>
+          <p:nvPr>
+            <p:ph type="sldImg" idx="2"/>
+          </p:nvPr>
+        </p:nvSpPr>
+        <p:spPr>
+          <a:xfrm>
+            <a:off x="685800" y="1143000"/>
+            <a:ext cx="5486400" cy="3086100"/>
+          </a:xfrm>
+          <a:prstGeom prst="rect">
+            <a:avLst/>
+          </a:prstGeom>
+          <a:noFill/>
+          <a:ln w="12700">
+            <a:solidFill>
+              <a:prstClr val="black"/>
+            </a:solidFill>
+          </a:ln>
+        </p:spPr>
+        <p:txBody>
+          <a:bodyPr vert="horz" lIns="91440" tIns="45720" rIns="91440" bIns="45720" rtlCol="0" anchor="ctr"/>
+          <a:lstStyle/>
+          <a:p>
+            <a:endParaRPr lang="fr-FR"/>
+          </a:p>
+        </p:txBody>
+      </p:sp>
+      <p:sp>
+        <p:nvSpPr>
+          <p:cNvPr id="5" name="Espace réservé des commentaires 4"/>
+          <p:cNvSpPr>
+            <a:spLocks noGrp="1"/>
+          </p:cNvSpPr>
+          <p:nvPr>
+            <p:ph type="body" sz="quarter" idx="3"/>
+          </p:nvPr>
+        </p:nvSpPr>
+        <p:spPr>
+          <a:xfrm>
+            <a:off x="685800" y="4400550"/>
+            <a:ext cx="5486400" cy="3600450"/>
+          </a:xfrm>
+          <a:prstGeom prst="rect">
+            <a:avLst/>
+          </a:prstGeom>
+        </p:spPr>
+        <p:txBody>
+          <a:bodyPr vert="horz" lIns="91440" tIns="45720" rIns="91440" bIns="45720" rtlCol="0"/>
+          <a:lstStyle/>
+          <a:p>
+            <a:pPr lvl="0"/>
+            <a:r>
+              <a:rPr lang="fr-FR" smtClean="0"/>
+              <a:t>Modifiez les styles du texte du masque</a:t>
+            </a:r>
+          </a:p>
+          <a:p>
+            <a:pPr lvl="1"/>
+            <a:r>
+              <a:rPr lang="fr-FR" smtClean="0"/>
+              <a:t>Deuxième niveau</a:t>
+            </a:r>
+          </a:p>
+          <a:p>
+            <a:pPr lvl="2"/>
+            <a:r>
+              <a:rPr lang="fr-FR" smtClean="0"/>
+              <a:t>Troisième niveau</a:t>
+            </a:r>
+          </a:p>
+          <a:p>
+            <a:pPr lvl="3"/>
+            <a:r>
+              <a:rPr lang="fr-FR" smtClean="0"/>
+              <a:t>Quatrième niveau</a:t>
+            </a:r>
+          </a:p>
+          <a:p>
+            <a:pPr lvl="4"/>
+            <a:r>
+              <a:rPr lang="fr-FR" smtClean="0"/>
+              <a:t>Cinquième niveau</a:t>
+            </a:r>
+            <a:endParaRPr lang="fr-FR"/>
+          </a:p>
+        </p:txBody>
+      </p:sp>
+      <p:sp>
+        <p:nvSpPr>
+          <p:cNvPr id="6" name="Espace réservé du pied de page 5"/>
+          <p:cNvSpPr>
+            <a:spLocks noGrp="1"/>
+          </p:cNvSpPr>
+          <p:nvPr>
+            <p:ph type="ftr" sz="quarter" idx="4"/>
+          </p:nvPr>
+        </p:nvSpPr>
+        <p:spPr>
+          <a:xfrm>
+            <a:off x="0" y="8685213"/>
+            <a:ext cx="2971800" cy="458787"/>
+          </a:xfrm>
+          <a:prstGeom prst="rect">
+            <a:avLst/>
+          </a:prstGeom>
+        </p:spPr>
+        <p:txBody>
+          <a:bodyPr vert="horz" lIns="91440" tIns="45720" rIns="91440" bIns="45720" rtlCol="0" anchor="b"/>
+          <a:lstStyle>
+            <a:lvl1pPr algn="l">
+              <a:defRPr sz="1200"/>
+            </a:lvl1pPr>
+          </a:lstStyle>
+          <a:p>
+            <a:endParaRPr lang="fr-FR"/>
+          </a:p>
+        </p:txBody>
+      </p:sp>
+      <p:sp>
+        <p:nvSpPr>
+          <p:cNvPr id="7" name="Espace réservé du numéro de diapositive 6"/>
+          <p:cNvSpPr>
+            <a:spLocks noGrp="1"/>
+          </p:cNvSpPr>
+          <p:nvPr>
+            <p:ph type="sldNum" sz="quarter" idx="5"/>
+          </p:nvPr>
+        </p:nvSpPr>
+        <p:spPr>
+          <a:xfrm>
+            <a:off x="3884613" y="8685213"/>
+            <a:ext cx="2971800" cy="458787"/>
+          </a:xfrm>
+          <a:prstGeom prst="rect">
+            <a:avLst/>
+          </a:prstGeom>
+        </p:spPr>
+        <p:txBody>
+          <a:bodyPr vert="horz" lIns="91440" tIns="45720" rIns="91440" bIns="45720" rtlCol="0" anchor="b"/>
+          <a:lstStyle>
+            <a:lvl1pPr algn="r">
+              <a:defRPr sz="1200"/>
+            </a:lvl1pPr>
+          </a:lstStyle>
+          <a:p>
+            <a:fld id="{98D6D126-DD00-4E45-94F1-6FDCCF5D6900}" type="slidenum">
+              <a:rPr lang="fr-FR" smtClean="0"/>
+              <a:t>‹N°›</a:t>
+            </a:fld>
+            <a:endParaRPr lang="fr-FR"/>
+          </a:p>
+        </p:txBody>
+      </p:sp>
+    </p:spTree>
+    <p:extLst>
+      <p:ext uri="{BB962C8B-B14F-4D97-AF65-F5344CB8AC3E}">
+        <p14:creationId xmlns:p14="http://schemas.microsoft.com/office/powerpoint/2010/main" val="111792166"/>
+      </p:ext>
+    </p:extLst>
+  </p:cSld>
+  <p:clrMap bg1="lt1" tx1="dk1" bg2="lt2" tx2="dk2" accent1="accent1" accent2="accent2" accent3="accent3" accent4="accent4" accent5="accent5" accent6="accent6" hlink="hlink" folHlink="folHlink"/>
+  <p:notesStyle>
+    <a:lvl1pPr marL="0" algn="l" defTabSz="914400" rtl="0" eaLnBrk="1" latinLnBrk="0" hangingPunct="1">
+      <a:defRPr sz="1200" kern="1200">
+        <a:solidFill>
+          <a:schemeClr val="tx1"/>
+        </a:solidFill>
+        <a:latin typeface="+mn-lt"/>
+        <a:ea typeface="+mn-ea"/>
+        <a:cs typeface="+mn-cs"/>
+      </a:defRPr>
+    </a:lvl1pPr>
+    <a:lvl2pPr marL="457200" algn="l" defTabSz="914400" rtl="0" eaLnBrk="1" latinLnBrk="0" hangingPunct="1">
+      <a:defRPr sz="1200" kern="1200">
+        <a:solidFill>
+          <a:schemeClr val="tx1"/>
+        </a:solidFill>
+        <a:latin typeface="+mn-lt"/>
+        <a:ea typeface="+mn-ea"/>
+        <a:cs typeface="+mn-cs"/>
+      </a:defRPr>
+    </a:lvl2pPr>
+    <a:lvl3pPr marL="914400" algn="l" defTabSz="914400" rtl="0" eaLnBrk="1" latinLnBrk="0" hangingPunct="1">
+      <a:defRPr sz="1200" kern="1200">
+        <a:solidFill>
+          <a:schemeClr val="tx1"/>
+        </a:solidFill>
+        <a:latin typeface="+mn-lt"/>
+        <a:ea typeface="+mn-ea"/>
+        <a:cs typeface="+mn-cs"/>
+      </a:defRPr>
+    </a:lvl3pPr>
+    <a:lvl4pPr marL="1371600" algn="l" defTabSz="914400" rtl="0" eaLnBrk="1" latinLnBrk="0" hangingPunct="1">
+      <a:defRPr sz="1200" kern="1200">
+        <a:solidFill>
+          <a:schemeClr val="tx1"/>
+        </a:solidFill>
+        <a:latin typeface="+mn-lt"/>
+        <a:ea typeface="+mn-ea"/>
+        <a:cs typeface="+mn-cs"/>
+      </a:defRPr>
+    </a:lvl4pPr>
+    <a:lvl5pPr marL="1828800" algn="l" defTabSz="914400" rtl="0" eaLnBrk="1" latinLnBrk="0" hangingPunct="1">
+      <a:defRPr sz="1200" kern="1200">
+        <a:solidFill>
+          <a:schemeClr val="tx1"/>
+        </a:solidFill>
+        <a:latin typeface="+mn-lt"/>
+        <a:ea typeface="+mn-ea"/>
+        <a:cs typeface="+mn-cs"/>
+      </a:defRPr>
+    </a:lvl5pPr>
+    <a:lvl6pPr marL="2286000" algn="l" defTabSz="914400" rtl="0" eaLnBrk="1" latinLnBrk="0" hangingPunct="1">
+      <a:defRPr sz="1200" kern="1200">
+        <a:solidFill>
+          <a:schemeClr val="tx1"/>
+        </a:solidFill>
+        <a:latin typeface="+mn-lt"/>
+        <a:ea typeface="+mn-ea"/>
+        <a:cs typeface="+mn-cs"/>
+      </a:defRPr>
+    </a:lvl6pPr>
+    <a:lvl7pPr marL="2743200" algn="l" defTabSz="914400" rtl="0" eaLnBrk="1" latinLnBrk="0" hangingPunct="1">
+      <a:defRPr sz="1200" kern="1200">
+        <a:solidFill>
+          <a:schemeClr val="tx1"/>
+        </a:solidFill>
+        <a:latin typeface="+mn-lt"/>
+        <a:ea typeface="+mn-ea"/>
+        <a:cs typeface="+mn-cs"/>
+      </a:defRPr>
+    </a:lvl7pPr>
+    <a:lvl8pPr marL="3200400" algn="l" defTabSz="914400" rtl="0" eaLnBrk="1" latinLnBrk="0" hangingPunct="1">
+      <a:defRPr sz="1200" kern="1200">
+        <a:solidFill>
+          <a:schemeClr val="tx1"/>
+        </a:solidFill>
+        <a:latin typeface="+mn-lt"/>
+        <a:ea typeface="+mn-ea"/>
+        <a:cs typeface="+mn-cs"/>
+      </a:defRPr>
+    </a:lvl8pPr>
+    <a:lvl9pPr marL="3657600" algn="l" defTabSz="914400" rtl="0" eaLnBrk="1" latinLnBrk="0" hangingPunct="1">
+      <a:defRPr sz="1200" kern="1200">
+        <a:solidFill>
+          <a:schemeClr val="tx1"/>
+        </a:solidFill>
+        <a:latin typeface="+mn-lt"/>
+        <a:ea typeface="+mn-ea"/>
+        <a:cs typeface="+mn-cs"/>
+      </a:defRPr>
+    </a:lvl9pPr>
+  </p:notesStyle>
+</p:notesMaster>
+</file>
+
+<file path=ppt/notesSlides/notesSlide1.xml><?xml version="1.0" encoding="utf-8"?>
+<p:notes xmlns:a="http://schemas.openxmlformats.org/drawingml/2006/main" xmlns:r="http://schemas.openxmlformats.org/officeDocument/2006/relationships" xmlns:p="http://schemas.openxmlformats.org/presentationml/2006/main">
+  <p:cSld>
+    <p:spTree>
+      <p:nvGrpSpPr>
+        <p:cNvPr id="1" name=""/>
+        <p:cNvGrpSpPr/>
+        <p:nvPr/>
+      </p:nvGrpSpPr>
+      <p:grpSpPr>
+        <a:xfrm>
+          <a:off x="0" y="0"/>
+          <a:ext cx="0" cy="0"/>
+          <a:chOff x="0" y="0"/>
+          <a:chExt cx="0" cy="0"/>
+        </a:xfrm>
+      </p:grpSpPr>
+      <p:sp>
+        <p:nvSpPr>
+          <p:cNvPr id="2" name="Espace réservé de l'image des diapositives 1"/>
+          <p:cNvSpPr>
+            <a:spLocks noGrp="1" noRot="1" noChangeAspect="1"/>
+          </p:cNvSpPr>
+          <p:nvPr>
+            <p:ph type="sldImg"/>
+          </p:nvPr>
+        </p:nvSpPr>
+        <p:spPr/>
+      </p:sp>
+      <p:sp>
+        <p:nvSpPr>
+          <p:cNvPr id="3" name="Espace réservé des commentaires 2"/>
+          <p:cNvSpPr>
+            <a:spLocks noGrp="1"/>
+          </p:cNvSpPr>
+          <p:nvPr>
+            <p:ph type="body" idx="1"/>
+          </p:nvPr>
+        </p:nvSpPr>
+        <p:spPr/>
+        <p:txBody>
+          <a:bodyPr/>
+          <a:lstStyle/>
+          <a:p>
+            <a:r>
+              <a:rPr lang="fr-FR" sz="1200" kern="1200" dirty="0" smtClean="0">
+                <a:solidFill>
+                  <a:schemeClr val="tx1"/>
+                </a:solidFill>
+                <a:effectLst/>
+                <a:latin typeface="+mn-lt"/>
+                <a:ea typeface="+mn-ea"/>
+                <a:cs typeface="+mn-cs"/>
+              </a:rPr>
+              <a:t>Création</a:t>
+            </a:r>
+            <a:r>
+              <a:rPr lang="fr-FR" sz="1200" kern="1200" baseline="0" dirty="0" smtClean="0">
+                <a:solidFill>
+                  <a:schemeClr val="tx1"/>
+                </a:solidFill>
+                <a:effectLst/>
+                <a:latin typeface="+mn-lt"/>
+                <a:ea typeface="+mn-ea"/>
+                <a:cs typeface="+mn-cs"/>
+              </a:rPr>
+              <a:t> d’</a:t>
+            </a:r>
+            <a:r>
+              <a:rPr lang="fr-FR" sz="1200" kern="1200" dirty="0" smtClean="0">
+                <a:solidFill>
+                  <a:schemeClr val="tx1"/>
+                </a:solidFill>
+                <a:effectLst/>
+                <a:latin typeface="+mn-lt"/>
+                <a:ea typeface="+mn-ea"/>
+                <a:cs typeface="+mn-cs"/>
+              </a:rPr>
+              <a:t>un site communautaire autour de l'escalade</a:t>
+            </a:r>
+          </a:p>
+          <a:p>
+            <a:endParaRPr lang="fr-FR" sz="1200" kern="1200" dirty="0" smtClean="0">
+              <a:solidFill>
+                <a:schemeClr val="tx1"/>
+              </a:solidFill>
+              <a:effectLst/>
+              <a:latin typeface="+mn-lt"/>
+              <a:ea typeface="+mn-ea"/>
+              <a:cs typeface="+mn-cs"/>
+            </a:endParaRPr>
+          </a:p>
+          <a:p>
+            <a:r>
+              <a:rPr lang="fr-FR" sz="1200" kern="1200" dirty="0" smtClean="0">
+                <a:solidFill>
+                  <a:schemeClr val="tx1"/>
+                </a:solidFill>
+                <a:effectLst/>
+                <a:latin typeface="+mn-lt"/>
+                <a:ea typeface="+mn-ea"/>
+                <a:cs typeface="+mn-cs"/>
+              </a:rPr>
+              <a:t>L’application web permet de</a:t>
+            </a:r>
+            <a:r>
+              <a:rPr lang="fr-FR" sz="1200" kern="1200" baseline="0" dirty="0" smtClean="0">
+                <a:solidFill>
+                  <a:schemeClr val="tx1"/>
+                </a:solidFill>
+                <a:effectLst/>
+                <a:latin typeface="+mn-lt"/>
+                <a:ea typeface="+mn-ea"/>
+                <a:cs typeface="+mn-cs"/>
+              </a:rPr>
+              <a:t> </a:t>
+            </a:r>
+            <a:r>
+              <a:rPr lang="fr-FR" sz="1200" kern="1200" dirty="0" smtClean="0">
+                <a:solidFill>
+                  <a:schemeClr val="tx1"/>
+                </a:solidFill>
+                <a:effectLst/>
+                <a:latin typeface="+mn-lt"/>
+                <a:ea typeface="+mn-ea"/>
+                <a:cs typeface="+mn-cs"/>
+              </a:rPr>
+              <a:t>:</a:t>
+            </a:r>
+          </a:p>
+          <a:p>
+            <a:endParaRPr lang="fr-FR" sz="1200" kern="1200" dirty="0" smtClean="0">
+              <a:solidFill>
+                <a:schemeClr val="tx1"/>
+              </a:solidFill>
+              <a:effectLst/>
+              <a:latin typeface="+mn-lt"/>
+              <a:ea typeface="+mn-ea"/>
+              <a:cs typeface="+mn-cs"/>
+            </a:endParaRPr>
+          </a:p>
+          <a:p>
+            <a:pPr marL="171450" lvl="0" indent="-171450">
+              <a:buFont typeface="Arial" panose="020B0604020202020204" pitchFamily="34" charset="0"/>
+              <a:buChar char="•"/>
+            </a:pPr>
+            <a:r>
+              <a:rPr lang="fr-FR" sz="1200" kern="1200" dirty="0" smtClean="0">
+                <a:solidFill>
+                  <a:schemeClr val="tx1"/>
+                </a:solidFill>
+                <a:effectLst/>
+                <a:latin typeface="+mn-lt"/>
+                <a:ea typeface="+mn-ea"/>
+                <a:cs typeface="+mn-cs"/>
+              </a:rPr>
+              <a:t>partager des informations sur les sites, leurs secteurs et les voies de chaque secteur (hauteur, cotation, nombre de points…</a:t>
+            </a:r>
+          </a:p>
+          <a:p>
+            <a:pPr marL="171450" lvl="0" indent="-171450">
+              <a:buFont typeface="Arial" panose="020B0604020202020204" pitchFamily="34" charset="0"/>
+              <a:buChar char="•"/>
+            </a:pPr>
+            <a:r>
+              <a:rPr lang="fr-FR" sz="1200" kern="1200" dirty="0" smtClean="0">
+                <a:solidFill>
+                  <a:schemeClr val="tx1"/>
+                </a:solidFill>
+                <a:effectLst/>
+                <a:latin typeface="+mn-lt"/>
+                <a:ea typeface="+mn-ea"/>
+                <a:cs typeface="+mn-cs"/>
+              </a:rPr>
+              <a:t>faire une recherche </a:t>
+            </a:r>
+            <a:r>
+              <a:rPr lang="fr-FR" sz="1200" kern="1200" dirty="0" err="1" smtClean="0">
+                <a:solidFill>
+                  <a:schemeClr val="tx1"/>
+                </a:solidFill>
+                <a:effectLst/>
+                <a:latin typeface="+mn-lt"/>
+                <a:ea typeface="+mn-ea"/>
+                <a:cs typeface="+mn-cs"/>
+              </a:rPr>
+              <a:t>multi-critères</a:t>
+            </a:r>
+            <a:r>
+              <a:rPr lang="fr-FR" sz="1200" kern="1200" dirty="0" smtClean="0">
+                <a:solidFill>
+                  <a:schemeClr val="tx1"/>
+                </a:solidFill>
+                <a:effectLst/>
+                <a:latin typeface="+mn-lt"/>
+                <a:ea typeface="+mn-ea"/>
+                <a:cs typeface="+mn-cs"/>
+              </a:rPr>
+              <a:t> pour trouver le</a:t>
+            </a:r>
+            <a:r>
+              <a:rPr lang="fr-FR" sz="1200" kern="1200" baseline="0" dirty="0" smtClean="0">
+                <a:solidFill>
+                  <a:schemeClr val="tx1"/>
+                </a:solidFill>
+                <a:effectLst/>
+                <a:latin typeface="+mn-lt"/>
+                <a:ea typeface="+mn-ea"/>
+                <a:cs typeface="+mn-cs"/>
+              </a:rPr>
+              <a:t> </a:t>
+            </a:r>
+            <a:r>
+              <a:rPr lang="fr-FR" sz="1200" kern="1200" dirty="0" smtClean="0">
+                <a:solidFill>
+                  <a:schemeClr val="tx1"/>
+                </a:solidFill>
+                <a:effectLst/>
+                <a:latin typeface="+mn-lt"/>
+                <a:ea typeface="+mn-ea"/>
+                <a:cs typeface="+mn-cs"/>
+              </a:rPr>
+              <a:t>prochain site de grimpe</a:t>
+            </a:r>
+          </a:p>
+          <a:p>
+            <a:pPr marL="171450" lvl="0" indent="-171450">
+              <a:buFont typeface="Arial" panose="020B0604020202020204" pitchFamily="34" charset="0"/>
+              <a:buChar char="•"/>
+            </a:pPr>
+            <a:r>
+              <a:rPr lang="fr-FR" sz="1200" kern="1200" dirty="0" smtClean="0">
+                <a:solidFill>
+                  <a:schemeClr val="tx1"/>
+                </a:solidFill>
+                <a:effectLst/>
+                <a:latin typeface="+mn-lt"/>
+                <a:ea typeface="+mn-ea"/>
+                <a:cs typeface="+mn-cs"/>
+              </a:rPr>
+              <a:t>laisser des commentaires</a:t>
+            </a:r>
+          </a:p>
+          <a:p>
+            <a:pPr marL="171450" lvl="0" indent="-171450">
+              <a:buFont typeface="Arial" panose="020B0604020202020204" pitchFamily="34" charset="0"/>
+              <a:buChar char="•"/>
+            </a:pPr>
+            <a:r>
+              <a:rPr lang="fr-FR" sz="1200" kern="1200" dirty="0" smtClean="0">
+                <a:solidFill>
+                  <a:schemeClr val="tx1"/>
+                </a:solidFill>
+                <a:effectLst/>
+                <a:latin typeface="+mn-lt"/>
+                <a:ea typeface="+mn-ea"/>
+                <a:cs typeface="+mn-cs"/>
+              </a:rPr>
+              <a:t>présenter les topo qui existent et les sites/secteurs qu’ils couvrent</a:t>
+            </a:r>
+          </a:p>
+          <a:p>
+            <a:pPr marL="171450" lvl="0" indent="-171450">
+              <a:buFont typeface="Arial" panose="020B0604020202020204" pitchFamily="34" charset="0"/>
+              <a:buChar char="•"/>
+            </a:pPr>
+            <a:r>
+              <a:rPr lang="fr-FR" sz="1200" kern="1200" dirty="0" smtClean="0">
+                <a:solidFill>
+                  <a:schemeClr val="tx1"/>
+                </a:solidFill>
+                <a:effectLst/>
+                <a:latin typeface="+mn-lt"/>
+                <a:ea typeface="+mn-ea"/>
+                <a:cs typeface="+mn-cs"/>
+              </a:rPr>
+              <a:t>avoir un espace de prêt de topo (les propriétaires de topo peuvent proposer le prêt de leur topo et les gens intéressés peuvent voir les topo disponibles et les réserver pour une période)</a:t>
+            </a:r>
+          </a:p>
+          <a:p>
+            <a:endParaRPr lang="fr-FR" dirty="0"/>
+          </a:p>
+        </p:txBody>
+      </p:sp>
+      <p:sp>
+        <p:nvSpPr>
+          <p:cNvPr id="4" name="Espace réservé du numéro de diapositive 3"/>
+          <p:cNvSpPr>
+            <a:spLocks noGrp="1"/>
+          </p:cNvSpPr>
+          <p:nvPr>
+            <p:ph type="sldNum" sz="quarter" idx="10"/>
+          </p:nvPr>
+        </p:nvSpPr>
+        <p:spPr/>
+        <p:txBody>
+          <a:bodyPr/>
+          <a:lstStyle/>
+          <a:p>
+            <a:fld id="{98D6D126-DD00-4E45-94F1-6FDCCF5D6900}" type="slidenum">
+              <a:rPr lang="fr-FR" smtClean="0"/>
+              <a:t>1</a:t>
+            </a:fld>
+            <a:endParaRPr lang="fr-FR"/>
+          </a:p>
+        </p:txBody>
+      </p:sp>
+    </p:spTree>
+    <p:extLst>
+      <p:ext uri="{BB962C8B-B14F-4D97-AF65-F5344CB8AC3E}">
+        <p14:creationId xmlns:p14="http://schemas.microsoft.com/office/powerpoint/2010/main" val="1850993229"/>
+      </p:ext>
+    </p:extLst>
+  </p:cSld>
+  <p:clrMapOvr>
+    <a:masterClrMapping/>
+  </p:clrMapOvr>
+</p:notes>
+</file>
+
+<file path=ppt/notesSlides/notesSlide2.xml><?xml version="1.0" encoding="utf-8"?>
+<p:notes xmlns:a="http://schemas.openxmlformats.org/drawingml/2006/main" xmlns:r="http://schemas.openxmlformats.org/officeDocument/2006/relationships" xmlns:p="http://schemas.openxmlformats.org/presentationml/2006/main">
+  <p:cSld>
+    <p:spTree>
+      <p:nvGrpSpPr>
+        <p:cNvPr id="1" name=""/>
+        <p:cNvGrpSpPr/>
+        <p:nvPr/>
+      </p:nvGrpSpPr>
+      <p:grpSpPr>
+        <a:xfrm>
+          <a:off x="0" y="0"/>
+          <a:ext cx="0" cy="0"/>
+          <a:chOff x="0" y="0"/>
+          <a:chExt cx="0" cy="0"/>
+        </a:xfrm>
+      </p:grpSpPr>
+      <p:sp>
+        <p:nvSpPr>
+          <p:cNvPr id="2" name="Espace réservé de l'image des diapositives 1"/>
+          <p:cNvSpPr>
+            <a:spLocks noGrp="1" noRot="1" noChangeAspect="1"/>
+          </p:cNvSpPr>
+          <p:nvPr>
+            <p:ph type="sldImg"/>
+          </p:nvPr>
+        </p:nvSpPr>
+        <p:spPr/>
+      </p:sp>
+      <p:sp>
+        <p:nvSpPr>
+          <p:cNvPr id="3" name="Espace réservé des commentaires 2"/>
+          <p:cNvSpPr>
+            <a:spLocks noGrp="1"/>
+          </p:cNvSpPr>
+          <p:nvPr>
+            <p:ph type="body" idx="1"/>
+          </p:nvPr>
+        </p:nvSpPr>
+        <p:spPr/>
+        <p:txBody>
+          <a:bodyPr/>
+          <a:lstStyle/>
+          <a:p>
+            <a:r>
+              <a:rPr lang="fr-FR" dirty="0" smtClean="0"/>
+              <a:t>La</a:t>
+            </a:r>
+            <a:r>
+              <a:rPr lang="fr-FR" baseline="0" dirty="0" smtClean="0"/>
+              <a:t> première étape était d’identifier les utilisateurs de l’application et </a:t>
+            </a:r>
+            <a:r>
+              <a:rPr lang="fr-FR" sz="1200" kern="1200" dirty="0" smtClean="0">
+                <a:solidFill>
+                  <a:schemeClr val="tx1"/>
+                </a:solidFill>
+                <a:effectLst/>
+                <a:latin typeface="+mn-lt"/>
+                <a:ea typeface="+mn-ea"/>
+                <a:cs typeface="+mn-cs"/>
+              </a:rPr>
+              <a:t>les fonctionnalités nécessaires pour ces utilisateurs</a:t>
+            </a:r>
+            <a:endParaRPr lang="fr-FR" baseline="0" dirty="0" smtClean="0"/>
+          </a:p>
+          <a:p>
+            <a:endParaRPr lang="fr-FR" dirty="0"/>
+          </a:p>
+        </p:txBody>
+      </p:sp>
+      <p:sp>
+        <p:nvSpPr>
+          <p:cNvPr id="4" name="Espace réservé du numéro de diapositive 3"/>
+          <p:cNvSpPr>
+            <a:spLocks noGrp="1"/>
+          </p:cNvSpPr>
+          <p:nvPr>
+            <p:ph type="sldNum" sz="quarter" idx="10"/>
+          </p:nvPr>
+        </p:nvSpPr>
+        <p:spPr/>
+        <p:txBody>
+          <a:bodyPr/>
+          <a:lstStyle/>
+          <a:p>
+            <a:fld id="{98D6D126-DD00-4E45-94F1-6FDCCF5D6900}" type="slidenum">
+              <a:rPr lang="fr-FR" smtClean="0"/>
+              <a:t>2</a:t>
+            </a:fld>
+            <a:endParaRPr lang="fr-FR"/>
+          </a:p>
+        </p:txBody>
+      </p:sp>
+    </p:spTree>
+    <p:extLst>
+      <p:ext uri="{BB962C8B-B14F-4D97-AF65-F5344CB8AC3E}">
+        <p14:creationId xmlns:p14="http://schemas.microsoft.com/office/powerpoint/2010/main" val="2645413758"/>
+      </p:ext>
+    </p:extLst>
+  </p:cSld>
+  <p:clrMapOvr>
+    <a:masterClrMapping/>
+  </p:clrMapOvr>
+</p:notes>
+</file>
+
+<file path=ppt/notesSlides/notesSlide3.xml><?xml version="1.0" encoding="utf-8"?>
+<p:notes xmlns:a="http://schemas.openxmlformats.org/drawingml/2006/main" xmlns:r="http://schemas.openxmlformats.org/officeDocument/2006/relationships" xmlns:p="http://schemas.openxmlformats.org/presentationml/2006/main">
+  <p:cSld>
+    <p:spTree>
+      <p:nvGrpSpPr>
+        <p:cNvPr id="1" name=""/>
+        <p:cNvGrpSpPr/>
+        <p:nvPr/>
+      </p:nvGrpSpPr>
+      <p:grpSpPr>
+        <a:xfrm>
+          <a:off x="0" y="0"/>
+          <a:ext cx="0" cy="0"/>
+          <a:chOff x="0" y="0"/>
+          <a:chExt cx="0" cy="0"/>
+        </a:xfrm>
+      </p:grpSpPr>
+      <p:sp>
+        <p:nvSpPr>
+          <p:cNvPr id="2" name="Espace réservé de l'image des diapositives 1"/>
+          <p:cNvSpPr>
+            <a:spLocks noGrp="1" noRot="1" noChangeAspect="1"/>
+          </p:cNvSpPr>
+          <p:nvPr>
+            <p:ph type="sldImg"/>
+          </p:nvPr>
+        </p:nvSpPr>
+        <p:spPr/>
+      </p:sp>
+      <p:sp>
+        <p:nvSpPr>
+          <p:cNvPr id="3" name="Espace réservé des commentaires 2"/>
+          <p:cNvSpPr>
+            <a:spLocks noGrp="1"/>
+          </p:cNvSpPr>
+          <p:nvPr>
+            <p:ph type="body" idx="1"/>
+          </p:nvPr>
+        </p:nvSpPr>
+        <p:spPr/>
+        <p:txBody>
+          <a:bodyPr/>
+          <a:lstStyle/>
+          <a:p>
+            <a:r>
+              <a:rPr lang="fr-FR" dirty="0" smtClean="0"/>
+              <a:t>J’ai identifier deux acteurs :</a:t>
+            </a:r>
+          </a:p>
+          <a:p>
+            <a:endParaRPr lang="fr-FR" dirty="0" smtClean="0"/>
+          </a:p>
+          <a:p>
+            <a:pPr marL="171450" indent="-171450">
+              <a:buFontTx/>
+              <a:buChar char="-"/>
+            </a:pPr>
+            <a:r>
+              <a:rPr lang="fr-FR" dirty="0" smtClean="0"/>
+              <a:t>Le grimpeur</a:t>
+            </a:r>
+          </a:p>
+          <a:p>
+            <a:pPr marL="171450" indent="-171450">
+              <a:buFontTx/>
+              <a:buChar char="-"/>
+            </a:pPr>
+            <a:r>
+              <a:rPr lang="fr-FR" dirty="0" smtClean="0"/>
+              <a:t>L’administrateur</a:t>
+            </a:r>
+          </a:p>
+          <a:p>
+            <a:pPr marL="171450" indent="-171450">
+              <a:buFontTx/>
+              <a:buChar char="-"/>
+            </a:pPr>
+            <a:endParaRPr lang="fr-FR" dirty="0" smtClean="0"/>
+          </a:p>
+          <a:p>
+            <a:pPr marL="171450" indent="-171450">
+              <a:buFontTx/>
+              <a:buChar char="-"/>
+            </a:pPr>
+            <a:endParaRPr lang="fr-FR" dirty="0" smtClean="0"/>
+          </a:p>
+          <a:p>
+            <a:pPr marL="171450" indent="-171450">
+              <a:buFontTx/>
+              <a:buChar char="-"/>
+            </a:pPr>
+            <a:endParaRPr lang="fr-FR" dirty="0"/>
+          </a:p>
+        </p:txBody>
+      </p:sp>
+      <p:sp>
+        <p:nvSpPr>
+          <p:cNvPr id="4" name="Espace réservé du numéro de diapositive 3"/>
+          <p:cNvSpPr>
+            <a:spLocks noGrp="1"/>
+          </p:cNvSpPr>
+          <p:nvPr>
+            <p:ph type="sldNum" sz="quarter" idx="10"/>
+          </p:nvPr>
+        </p:nvSpPr>
+        <p:spPr/>
+        <p:txBody>
+          <a:bodyPr/>
+          <a:lstStyle/>
+          <a:p>
+            <a:fld id="{98D6D126-DD00-4E45-94F1-6FDCCF5D6900}" type="slidenum">
+              <a:rPr lang="fr-FR" smtClean="0"/>
+              <a:t>3</a:t>
+            </a:fld>
+            <a:endParaRPr lang="fr-FR"/>
+          </a:p>
+        </p:txBody>
+      </p:sp>
+    </p:spTree>
+    <p:extLst>
+      <p:ext uri="{BB962C8B-B14F-4D97-AF65-F5344CB8AC3E}">
+        <p14:creationId xmlns:p14="http://schemas.microsoft.com/office/powerpoint/2010/main" val="310656213"/>
+      </p:ext>
+    </p:extLst>
+  </p:cSld>
+  <p:clrMapOvr>
+    <a:masterClrMapping/>
+  </p:clrMapOvr>
+</p:notes>
+</file>
+
+<file path=ppt/notesSlides/notesSlide4.xml><?xml version="1.0" encoding="utf-8"?>
+<p:notes xmlns:a="http://schemas.openxmlformats.org/drawingml/2006/main" xmlns:r="http://schemas.openxmlformats.org/officeDocument/2006/relationships" xmlns:p="http://schemas.openxmlformats.org/presentationml/2006/main">
+  <p:cSld>
+    <p:spTree>
+      <p:nvGrpSpPr>
+        <p:cNvPr id="1" name=""/>
+        <p:cNvGrpSpPr/>
+        <p:nvPr/>
+      </p:nvGrpSpPr>
+      <p:grpSpPr>
+        <a:xfrm>
+          <a:off x="0" y="0"/>
+          <a:ext cx="0" cy="0"/>
+          <a:chOff x="0" y="0"/>
+          <a:chExt cx="0" cy="0"/>
+        </a:xfrm>
+      </p:grpSpPr>
+      <p:sp>
+        <p:nvSpPr>
+          <p:cNvPr id="2" name="Espace réservé de l'image des diapositives 1"/>
+          <p:cNvSpPr>
+            <a:spLocks noGrp="1" noRot="1" noChangeAspect="1"/>
+          </p:cNvSpPr>
+          <p:nvPr>
+            <p:ph type="sldImg"/>
+          </p:nvPr>
+        </p:nvSpPr>
+        <p:spPr/>
+      </p:sp>
+      <p:sp>
+        <p:nvSpPr>
+          <p:cNvPr id="3" name="Espace réservé des commentaires 2"/>
+          <p:cNvSpPr>
+            <a:spLocks noGrp="1"/>
+          </p:cNvSpPr>
+          <p:nvPr>
+            <p:ph type="body" idx="1"/>
+          </p:nvPr>
+        </p:nvSpPr>
+        <p:spPr/>
+        <p:txBody>
+          <a:bodyPr/>
+          <a:lstStyle/>
+          <a:p>
+            <a:r>
+              <a:rPr lang="fr-FR" dirty="0" smtClean="0"/>
+              <a:t>Ces deux acteurs partagent plusieurs</a:t>
+            </a:r>
+            <a:r>
+              <a:rPr lang="fr-FR" baseline="0" dirty="0" smtClean="0"/>
+              <a:t> cas d’utilisation qui correspondent à l’expression des besoins, on peut citer :</a:t>
+            </a:r>
+          </a:p>
+          <a:p>
+            <a:endParaRPr lang="fr-FR" baseline="0" dirty="0" smtClean="0"/>
+          </a:p>
+          <a:p>
+            <a:r>
+              <a:rPr lang="fr-FR" baseline="0" dirty="0" smtClean="0"/>
+              <a:t>- Rechercher des sites,  laisser un commentaire … </a:t>
+            </a:r>
+            <a:r>
+              <a:rPr lang="fr-FR" baseline="0" dirty="0" err="1" smtClean="0"/>
+              <a:t>etc</a:t>
+            </a:r>
+            <a:endParaRPr lang="fr-FR" dirty="0"/>
+          </a:p>
+        </p:txBody>
+      </p:sp>
+      <p:sp>
+        <p:nvSpPr>
+          <p:cNvPr id="4" name="Espace réservé du numéro de diapositive 3"/>
+          <p:cNvSpPr>
+            <a:spLocks noGrp="1"/>
+          </p:cNvSpPr>
+          <p:nvPr>
+            <p:ph type="sldNum" sz="quarter" idx="10"/>
+          </p:nvPr>
+        </p:nvSpPr>
+        <p:spPr/>
+        <p:txBody>
+          <a:bodyPr/>
+          <a:lstStyle/>
+          <a:p>
+            <a:fld id="{98D6D126-DD00-4E45-94F1-6FDCCF5D6900}" type="slidenum">
+              <a:rPr lang="fr-FR" smtClean="0"/>
+              <a:t>4</a:t>
+            </a:fld>
+            <a:endParaRPr lang="fr-FR"/>
+          </a:p>
+        </p:txBody>
+      </p:sp>
+    </p:spTree>
+    <p:extLst>
+      <p:ext uri="{BB962C8B-B14F-4D97-AF65-F5344CB8AC3E}">
+        <p14:creationId xmlns:p14="http://schemas.microsoft.com/office/powerpoint/2010/main" val="3672924221"/>
+      </p:ext>
+    </p:extLst>
+  </p:cSld>
+  <p:clrMapOvr>
+    <a:masterClrMapping/>
+  </p:clrMapOvr>
+</p:notes>
+</file>
+
+<file path=ppt/notesSlides/notesSlide5.xml><?xml version="1.0" encoding="utf-8"?>
+<p:notes xmlns:a="http://schemas.openxmlformats.org/drawingml/2006/main" xmlns:r="http://schemas.openxmlformats.org/officeDocument/2006/relationships" xmlns:p="http://schemas.openxmlformats.org/presentationml/2006/main">
+  <p:cSld>
+    <p:spTree>
+      <p:nvGrpSpPr>
+        <p:cNvPr id="1" name=""/>
+        <p:cNvGrpSpPr/>
+        <p:nvPr/>
+      </p:nvGrpSpPr>
+      <p:grpSpPr>
+        <a:xfrm>
+          <a:off x="0" y="0"/>
+          <a:ext cx="0" cy="0"/>
+          <a:chOff x="0" y="0"/>
+          <a:chExt cx="0" cy="0"/>
+        </a:xfrm>
+      </p:grpSpPr>
+      <p:sp>
+        <p:nvSpPr>
+          <p:cNvPr id="2" name="Espace réservé de l'image des diapositives 1"/>
+          <p:cNvSpPr>
+            <a:spLocks noGrp="1" noRot="1" noChangeAspect="1"/>
+          </p:cNvSpPr>
+          <p:nvPr>
+            <p:ph type="sldImg"/>
+          </p:nvPr>
+        </p:nvSpPr>
+        <p:spPr/>
+      </p:sp>
+      <p:sp>
+        <p:nvSpPr>
+          <p:cNvPr id="3" name="Espace réservé des commentaires 2"/>
+          <p:cNvSpPr>
+            <a:spLocks noGrp="1"/>
+          </p:cNvSpPr>
+          <p:nvPr>
+            <p:ph type="body" idx="1"/>
+          </p:nvPr>
+        </p:nvSpPr>
+        <p:spPr/>
+        <p:txBody>
+          <a:bodyPr/>
+          <a:lstStyle/>
+          <a:p>
+            <a:r>
+              <a:rPr lang="fr-FR" dirty="0" smtClean="0"/>
+              <a:t>Avant de commencer le développement de l’application, j’ai créé un diagramme de classes pour identifier les entités et la relations qui les relient.</a:t>
+            </a:r>
+          </a:p>
+          <a:p>
+            <a:r>
+              <a:rPr lang="fr-FR" dirty="0" smtClean="0"/>
+              <a:t>Ainsi que une base de données</a:t>
+            </a:r>
+            <a:r>
+              <a:rPr lang="fr-FR" baseline="0" dirty="0" smtClean="0"/>
+              <a:t> se basant sur ce diagramme de classe.</a:t>
+            </a:r>
+            <a:endParaRPr lang="fr-FR" dirty="0" smtClean="0"/>
+          </a:p>
+          <a:p>
+            <a:endParaRPr lang="fr-FR" dirty="0"/>
+          </a:p>
+        </p:txBody>
+      </p:sp>
+      <p:sp>
+        <p:nvSpPr>
+          <p:cNvPr id="4" name="Espace réservé du numéro de diapositive 3"/>
+          <p:cNvSpPr>
+            <a:spLocks noGrp="1"/>
+          </p:cNvSpPr>
+          <p:nvPr>
+            <p:ph type="sldNum" sz="quarter" idx="10"/>
+          </p:nvPr>
+        </p:nvSpPr>
+        <p:spPr/>
+        <p:txBody>
+          <a:bodyPr/>
+          <a:lstStyle/>
+          <a:p>
+            <a:fld id="{98D6D126-DD00-4E45-94F1-6FDCCF5D6900}" type="slidenum">
+              <a:rPr lang="fr-FR" smtClean="0"/>
+              <a:t>6</a:t>
+            </a:fld>
+            <a:endParaRPr lang="fr-FR"/>
+          </a:p>
+        </p:txBody>
+      </p:sp>
+    </p:spTree>
+    <p:extLst>
+      <p:ext uri="{BB962C8B-B14F-4D97-AF65-F5344CB8AC3E}">
+        <p14:creationId xmlns:p14="http://schemas.microsoft.com/office/powerpoint/2010/main" val="1704729113"/>
+      </p:ext>
+    </p:extLst>
+  </p:cSld>
+  <p:clrMapOvr>
+    <a:masterClrMapping/>
+  </p:clrMapOvr>
+</p:notes>
+</file>
+
+<file path=ppt/notesSlides/notesSlide6.xml><?xml version="1.0" encoding="utf-8"?>
+<p:notes xmlns:a="http://schemas.openxmlformats.org/drawingml/2006/main" xmlns:r="http://schemas.openxmlformats.org/officeDocument/2006/relationships" xmlns:p="http://schemas.openxmlformats.org/presentationml/2006/main">
+  <p:cSld>
+    <p:spTree>
+      <p:nvGrpSpPr>
+        <p:cNvPr id="1" name=""/>
+        <p:cNvGrpSpPr/>
+        <p:nvPr/>
+      </p:nvGrpSpPr>
+      <p:grpSpPr>
+        <a:xfrm>
+          <a:off x="0" y="0"/>
+          <a:ext cx="0" cy="0"/>
+          <a:chOff x="0" y="0"/>
+          <a:chExt cx="0" cy="0"/>
+        </a:xfrm>
+      </p:grpSpPr>
+      <p:sp>
+        <p:nvSpPr>
+          <p:cNvPr id="2" name="Espace réservé de l'image des diapositives 1"/>
+          <p:cNvSpPr>
+            <a:spLocks noGrp="1" noRot="1" noChangeAspect="1"/>
+          </p:cNvSpPr>
+          <p:nvPr>
+            <p:ph type="sldImg"/>
+          </p:nvPr>
+        </p:nvSpPr>
+        <p:spPr/>
+      </p:sp>
+      <p:sp>
+        <p:nvSpPr>
+          <p:cNvPr id="3" name="Espace réservé des commentaires 2"/>
+          <p:cNvSpPr>
+            <a:spLocks noGrp="1"/>
+          </p:cNvSpPr>
+          <p:nvPr>
+            <p:ph type="body" idx="1"/>
+          </p:nvPr>
+        </p:nvSpPr>
+        <p:spPr/>
+        <p:txBody>
+          <a:bodyPr/>
+          <a:lstStyle/>
+          <a:p>
+            <a:r>
+              <a:rPr lang="fr-FR" sz="1200" b="0" i="0" kern="1200" dirty="0" smtClean="0">
+                <a:solidFill>
+                  <a:schemeClr val="tx1"/>
+                </a:solidFill>
+                <a:effectLst/>
+                <a:latin typeface="+mn-lt"/>
+                <a:ea typeface="+mn-ea"/>
+                <a:cs typeface="+mn-cs"/>
+              </a:rPr>
+              <a:t>Architecture trois tiers :</a:t>
+            </a:r>
+          </a:p>
+          <a:p>
+            <a:endParaRPr lang="fr-FR" sz="1200" b="0" i="0" kern="1200" dirty="0" smtClean="0">
+              <a:solidFill>
+                <a:schemeClr val="tx1"/>
+              </a:solidFill>
+              <a:effectLst/>
+              <a:latin typeface="+mn-lt"/>
+              <a:ea typeface="+mn-ea"/>
+              <a:cs typeface="+mn-cs"/>
+            </a:endParaRPr>
+          </a:p>
+          <a:p>
+            <a:r>
+              <a:rPr lang="fr-FR" sz="1200" b="0" i="0" kern="1200" dirty="0" smtClean="0">
+                <a:solidFill>
+                  <a:schemeClr val="tx1"/>
+                </a:solidFill>
+                <a:effectLst/>
+                <a:latin typeface="+mn-lt"/>
+                <a:ea typeface="+mn-ea"/>
+                <a:cs typeface="+mn-cs"/>
+              </a:rPr>
+              <a:t>- couche de </a:t>
+            </a:r>
+            <a:r>
+              <a:rPr lang="fr-FR" sz="1200" b="0" i="1" kern="1200" dirty="0" smtClean="0">
+                <a:solidFill>
+                  <a:schemeClr val="tx1"/>
+                </a:solidFill>
+                <a:effectLst/>
+                <a:latin typeface="+mn-lt"/>
+                <a:ea typeface="+mn-ea"/>
+                <a:cs typeface="+mn-cs"/>
+              </a:rPr>
+              <a:t>présentation</a:t>
+            </a:r>
+            <a:r>
+              <a:rPr lang="fr-FR" sz="1200" b="0" i="0" kern="1200" dirty="0" smtClean="0">
+                <a:solidFill>
+                  <a:schemeClr val="tx1"/>
+                </a:solidFill>
+                <a:effectLst/>
+                <a:latin typeface="+mn-lt"/>
+                <a:ea typeface="+mn-ea"/>
+                <a:cs typeface="+mn-cs"/>
+              </a:rPr>
+              <a:t> ;</a:t>
+            </a:r>
+          </a:p>
+          <a:p>
+            <a:r>
+              <a:rPr lang="fr-FR" sz="1200" b="0" i="0" kern="1200" dirty="0" smtClean="0">
+                <a:solidFill>
+                  <a:schemeClr val="tx1"/>
+                </a:solidFill>
+                <a:effectLst/>
+                <a:latin typeface="+mn-lt"/>
+                <a:ea typeface="+mn-ea"/>
+                <a:cs typeface="+mn-cs"/>
+              </a:rPr>
+              <a:t>- couche de </a:t>
+            </a:r>
+            <a:r>
+              <a:rPr lang="fr-FR" sz="1200" b="0" i="1" kern="1200" dirty="0" smtClean="0">
+                <a:solidFill>
+                  <a:schemeClr val="tx1"/>
+                </a:solidFill>
+                <a:effectLst/>
+                <a:latin typeface="+mn-lt"/>
+                <a:ea typeface="+mn-ea"/>
+                <a:cs typeface="+mn-cs"/>
+              </a:rPr>
+              <a:t>traitement</a:t>
+            </a:r>
+            <a:r>
+              <a:rPr lang="fr-FR" sz="1200" b="0" i="0" kern="1200" dirty="0" smtClean="0">
+                <a:solidFill>
+                  <a:schemeClr val="tx1"/>
+                </a:solidFill>
+                <a:effectLst/>
+                <a:latin typeface="+mn-lt"/>
+                <a:ea typeface="+mn-ea"/>
+                <a:cs typeface="+mn-cs"/>
+              </a:rPr>
+              <a:t> ;</a:t>
+            </a:r>
+          </a:p>
+          <a:p>
+            <a:r>
+              <a:rPr lang="fr-FR" sz="1200" b="0" i="0" kern="1200" dirty="0" smtClean="0">
+                <a:solidFill>
+                  <a:schemeClr val="tx1"/>
+                </a:solidFill>
+                <a:effectLst/>
+                <a:latin typeface="+mn-lt"/>
+                <a:ea typeface="+mn-ea"/>
+                <a:cs typeface="+mn-cs"/>
+              </a:rPr>
+              <a:t>- couche d'</a:t>
+            </a:r>
+            <a:r>
+              <a:rPr lang="fr-FR" sz="1200" b="0" i="1" kern="1200" dirty="0" smtClean="0">
+                <a:solidFill>
+                  <a:schemeClr val="tx1"/>
+                </a:solidFill>
+                <a:effectLst/>
+                <a:latin typeface="+mn-lt"/>
+                <a:ea typeface="+mn-ea"/>
+                <a:cs typeface="+mn-cs"/>
+              </a:rPr>
+              <a:t>accès aux données</a:t>
+            </a:r>
+            <a:r>
+              <a:rPr lang="fr-FR" sz="1200" b="0" i="0" kern="1200" dirty="0" smtClean="0">
+                <a:solidFill>
+                  <a:schemeClr val="tx1"/>
+                </a:solidFill>
+                <a:effectLst/>
+                <a:latin typeface="+mn-lt"/>
+                <a:ea typeface="+mn-ea"/>
+                <a:cs typeface="+mn-cs"/>
+              </a:rPr>
+              <a:t>.</a:t>
+            </a:r>
+          </a:p>
+          <a:p>
+            <a:endParaRPr lang="fr-FR" dirty="0" smtClean="0"/>
+          </a:p>
+          <a:p>
+            <a:endParaRPr lang="fr-FR" dirty="0" smtClean="0"/>
+          </a:p>
+          <a:p>
+            <a:r>
+              <a:rPr lang="fr-FR" dirty="0" smtClean="0"/>
+              <a:t>En génie logiciel, une architecture à plusieurs niveaux (souvent appelée architecture à plusieurs niveaux) est une architecture client-serveur dans laquelle la présentation, le traitement de l'application et la gestion des données sont des processus logiquement distincts. Par exemple, une application qui utilise un middleware pour traiter les demandes de données entre un utilisateur et une base de données utilise une architecture à plusieurs niveaux. L’utilisation la plus répandue de l’architecture à plusieurs niveaux est l’architecture à trois niveaux.</a:t>
+            </a:r>
+          </a:p>
+          <a:p>
+            <a:endParaRPr lang="fr-FR" dirty="0" smtClean="0"/>
+          </a:p>
+          <a:p>
+            <a:r>
+              <a:rPr lang="fr-FR" dirty="0" smtClean="0"/>
+              <a:t>https://www.supinfo.com/articles/single/6437-fonctionnement-une-architecture-trois-tiers</a:t>
+            </a:r>
+          </a:p>
+          <a:p>
+            <a:endParaRPr lang="fr-FR" dirty="0" smtClean="0"/>
+          </a:p>
+          <a:p>
+            <a:r>
+              <a:rPr lang="fr-FR" sz="1200" b="1" i="0" kern="1200" dirty="0" smtClean="0">
+                <a:solidFill>
+                  <a:schemeClr val="tx1"/>
+                </a:solidFill>
+                <a:effectLst/>
+                <a:latin typeface="+mn-lt"/>
+                <a:ea typeface="+mn-ea"/>
+                <a:cs typeface="+mn-cs"/>
+              </a:rPr>
+              <a:t>Modèle-vue-contrôleur</a:t>
+            </a:r>
+            <a:r>
+              <a:rPr lang="fr-FR" sz="1200" b="0" i="0" kern="1200" dirty="0" smtClean="0">
+                <a:solidFill>
+                  <a:schemeClr val="tx1"/>
+                </a:solidFill>
+                <a:effectLst/>
+                <a:latin typeface="+mn-lt"/>
+                <a:ea typeface="+mn-ea"/>
+                <a:cs typeface="+mn-cs"/>
+              </a:rPr>
+              <a:t> ou </a:t>
+            </a:r>
+            <a:r>
+              <a:rPr lang="fr-FR" sz="1200" b="1" i="0" kern="1200" dirty="0" smtClean="0">
+                <a:solidFill>
+                  <a:schemeClr val="tx1"/>
+                </a:solidFill>
+                <a:effectLst/>
+                <a:latin typeface="+mn-lt"/>
+                <a:ea typeface="+mn-ea"/>
+                <a:cs typeface="+mn-cs"/>
+              </a:rPr>
+              <a:t>MVC</a:t>
+            </a:r>
+            <a:r>
+              <a:rPr lang="fr-FR" sz="1200" b="0" i="0" kern="1200" dirty="0" smtClean="0">
+                <a:solidFill>
+                  <a:schemeClr val="tx1"/>
+                </a:solidFill>
+                <a:effectLst/>
+                <a:latin typeface="+mn-lt"/>
+                <a:ea typeface="+mn-ea"/>
+                <a:cs typeface="+mn-cs"/>
+              </a:rPr>
+              <a:t> est un motif d'</a:t>
+            </a:r>
+            <a:r>
+              <a:rPr lang="fr-FR" sz="1200" b="0" i="0" u="none" strike="noStrike" kern="1200" dirty="0" smtClean="0">
+                <a:solidFill>
+                  <a:schemeClr val="tx1"/>
+                </a:solidFill>
+                <a:effectLst/>
+                <a:latin typeface="+mn-lt"/>
+                <a:ea typeface="+mn-ea"/>
+                <a:cs typeface="+mn-cs"/>
+                <a:hlinkClick r:id="rId3" tooltip="Architecture logicielle"/>
+              </a:rPr>
+              <a:t>architecture logicielle</a:t>
+            </a:r>
+            <a:r>
+              <a:rPr lang="fr-FR" sz="1200" b="0" i="0" kern="1200" dirty="0" smtClean="0">
+                <a:solidFill>
+                  <a:schemeClr val="tx1"/>
+                </a:solidFill>
+                <a:effectLst/>
+                <a:latin typeface="+mn-lt"/>
+                <a:ea typeface="+mn-ea"/>
+                <a:cs typeface="+mn-cs"/>
+              </a:rPr>
+              <a:t> destiné aux </a:t>
+            </a:r>
+            <a:r>
+              <a:rPr lang="fr-FR" sz="1200" b="0" i="0" u="none" strike="noStrike" kern="1200" dirty="0" smtClean="0">
+                <a:solidFill>
+                  <a:schemeClr val="tx1"/>
+                </a:solidFill>
+                <a:effectLst/>
+                <a:latin typeface="+mn-lt"/>
+                <a:ea typeface="+mn-ea"/>
+                <a:cs typeface="+mn-cs"/>
+                <a:hlinkClick r:id="rId4" tooltip="Interface graphique"/>
+              </a:rPr>
+              <a:t>interfaces graphiques</a:t>
+            </a:r>
+            <a:r>
+              <a:rPr lang="fr-FR" sz="1200" b="0" i="0" kern="1200" dirty="0" smtClean="0">
+                <a:solidFill>
+                  <a:schemeClr val="tx1"/>
+                </a:solidFill>
+                <a:effectLst/>
+                <a:latin typeface="+mn-lt"/>
+                <a:ea typeface="+mn-ea"/>
+                <a:cs typeface="+mn-cs"/>
+              </a:rPr>
+              <a:t> lancé en 1978 et très populaire pour les </a:t>
+            </a:r>
+            <a:r>
+              <a:rPr lang="fr-FR" sz="1200" b="0" i="0" u="none" strike="noStrike" kern="1200" dirty="0" smtClean="0">
+                <a:solidFill>
+                  <a:schemeClr val="tx1"/>
+                </a:solidFill>
+                <a:effectLst/>
+                <a:latin typeface="+mn-lt"/>
+                <a:ea typeface="+mn-ea"/>
+                <a:cs typeface="+mn-cs"/>
+                <a:hlinkClick r:id="rId5" tooltip="Application web"/>
+              </a:rPr>
+              <a:t>applications web</a:t>
+            </a:r>
+            <a:r>
+              <a:rPr lang="fr-FR" sz="1200" b="0" i="0" kern="1200" dirty="0" smtClean="0">
+                <a:solidFill>
+                  <a:schemeClr val="tx1"/>
+                </a:solidFill>
+                <a:effectLst/>
+                <a:latin typeface="+mn-lt"/>
+                <a:ea typeface="+mn-ea"/>
+                <a:cs typeface="+mn-cs"/>
+              </a:rPr>
+              <a:t>. Le motif est composé de trois types de modules ayant trois responsabilités différentes : les modèles, les vues et les contrôleurs.</a:t>
+            </a:r>
+          </a:p>
+          <a:p>
+            <a:r>
+              <a:rPr lang="fr-FR" sz="1200" b="0" i="0" kern="1200" dirty="0" smtClean="0">
+                <a:solidFill>
+                  <a:schemeClr val="tx1"/>
+                </a:solidFill>
+                <a:effectLst/>
+                <a:latin typeface="+mn-lt"/>
+                <a:ea typeface="+mn-ea"/>
+                <a:cs typeface="+mn-cs"/>
+              </a:rPr>
+              <a:t>Un modèle (Model) contient les données à afficher.</a:t>
+            </a:r>
+          </a:p>
+          <a:p>
+            <a:r>
+              <a:rPr lang="fr-FR" sz="1200" b="0" i="0" kern="1200" dirty="0" smtClean="0">
+                <a:solidFill>
+                  <a:schemeClr val="tx1"/>
+                </a:solidFill>
+                <a:effectLst/>
+                <a:latin typeface="+mn-lt"/>
+                <a:ea typeface="+mn-ea"/>
+                <a:cs typeface="+mn-cs"/>
+              </a:rPr>
+              <a:t>Une vue (</a:t>
+            </a:r>
+            <a:r>
+              <a:rPr lang="fr-FR" sz="1200" b="0" i="0" kern="1200" dirty="0" err="1" smtClean="0">
+                <a:solidFill>
+                  <a:schemeClr val="tx1"/>
+                </a:solidFill>
+                <a:effectLst/>
+                <a:latin typeface="+mn-lt"/>
+                <a:ea typeface="+mn-ea"/>
+                <a:cs typeface="+mn-cs"/>
+              </a:rPr>
+              <a:t>View</a:t>
+            </a:r>
+            <a:r>
+              <a:rPr lang="fr-FR" sz="1200" b="0" i="0" kern="1200" dirty="0" smtClean="0">
+                <a:solidFill>
+                  <a:schemeClr val="tx1"/>
+                </a:solidFill>
+                <a:effectLst/>
+                <a:latin typeface="+mn-lt"/>
+                <a:ea typeface="+mn-ea"/>
+                <a:cs typeface="+mn-cs"/>
+              </a:rPr>
+              <a:t>) contient la présentation de l'interface graphique.</a:t>
+            </a:r>
+          </a:p>
+          <a:p>
+            <a:r>
+              <a:rPr lang="fr-FR" sz="1200" b="0" i="0" kern="1200" dirty="0" smtClean="0">
+                <a:solidFill>
+                  <a:schemeClr val="tx1"/>
+                </a:solidFill>
+                <a:effectLst/>
+                <a:latin typeface="+mn-lt"/>
+                <a:ea typeface="+mn-ea"/>
+                <a:cs typeface="+mn-cs"/>
+              </a:rPr>
+              <a:t>Un contrôleur (Controller) contient la logique concernant les actions effectuées par l'utilisateur.</a:t>
+            </a:r>
+          </a:p>
+          <a:p>
+            <a:endParaRPr lang="fr-FR" dirty="0" smtClean="0"/>
+          </a:p>
+          <a:p>
+            <a:endParaRPr lang="fr-FR" dirty="0" smtClean="0"/>
+          </a:p>
+          <a:p>
+            <a:endParaRPr lang="fr-FR" dirty="0"/>
+          </a:p>
+        </p:txBody>
+      </p:sp>
+      <p:sp>
+        <p:nvSpPr>
+          <p:cNvPr id="4" name="Espace réservé du numéro de diapositive 3"/>
+          <p:cNvSpPr>
+            <a:spLocks noGrp="1"/>
+          </p:cNvSpPr>
+          <p:nvPr>
+            <p:ph type="sldNum" sz="quarter" idx="10"/>
+          </p:nvPr>
+        </p:nvSpPr>
+        <p:spPr/>
+        <p:txBody>
+          <a:bodyPr/>
+          <a:lstStyle/>
+          <a:p>
+            <a:fld id="{98D6D126-DD00-4E45-94F1-6FDCCF5D6900}" type="slidenum">
+              <a:rPr lang="fr-FR" smtClean="0"/>
+              <a:t>7</a:t>
+            </a:fld>
+            <a:endParaRPr lang="fr-FR"/>
+          </a:p>
+        </p:txBody>
+      </p:sp>
+    </p:spTree>
+    <p:extLst>
+      <p:ext uri="{BB962C8B-B14F-4D97-AF65-F5344CB8AC3E}">
+        <p14:creationId xmlns:p14="http://schemas.microsoft.com/office/powerpoint/2010/main" val="607455109"/>
+      </p:ext>
+    </p:extLst>
+  </p:cSld>
+  <p:clrMapOvr>
+    <a:masterClrMapping/>
+  </p:clrMapOvr>
+</p:notes>
+</file>
+
+<file path=ppt/notesSlides/notesSlide7.xml><?xml version="1.0" encoding="utf-8"?>
+<p:notes xmlns:a="http://schemas.openxmlformats.org/drawingml/2006/main" xmlns:r="http://schemas.openxmlformats.org/officeDocument/2006/relationships" xmlns:p="http://schemas.openxmlformats.org/presentationml/2006/main">
+  <p:cSld>
+    <p:spTree>
+      <p:nvGrpSpPr>
+        <p:cNvPr id="1" name=""/>
+        <p:cNvGrpSpPr/>
+        <p:nvPr/>
+      </p:nvGrpSpPr>
+      <p:grpSpPr>
+        <a:xfrm>
+          <a:off x="0" y="0"/>
+          <a:ext cx="0" cy="0"/>
+          <a:chOff x="0" y="0"/>
+          <a:chExt cx="0" cy="0"/>
+        </a:xfrm>
+      </p:grpSpPr>
+      <p:sp>
+        <p:nvSpPr>
+          <p:cNvPr id="2" name="Espace réservé de l'image des diapositives 1"/>
+          <p:cNvSpPr>
+            <a:spLocks noGrp="1" noRot="1" noChangeAspect="1"/>
+          </p:cNvSpPr>
+          <p:nvPr>
+            <p:ph type="sldImg"/>
+          </p:nvPr>
+        </p:nvSpPr>
+        <p:spPr/>
+      </p:sp>
+      <p:sp>
+        <p:nvSpPr>
+          <p:cNvPr id="3" name="Espace réservé des commentaires 2"/>
+          <p:cNvSpPr>
+            <a:spLocks noGrp="1"/>
+          </p:cNvSpPr>
+          <p:nvPr>
+            <p:ph type="body" idx="1"/>
+          </p:nvPr>
+        </p:nvSpPr>
+        <p:spPr/>
+        <p:txBody>
+          <a:bodyPr/>
+          <a:lstStyle/>
+          <a:p>
+            <a:endParaRPr lang="fr-FR" dirty="0" smtClean="0"/>
+          </a:p>
+          <a:p>
+            <a:r>
+              <a:rPr lang="fr-FR" dirty="0" smtClean="0"/>
+              <a:t>Java EE : </a:t>
+            </a:r>
+            <a:endParaRPr lang="fr-FR" dirty="0"/>
+          </a:p>
+        </p:txBody>
+      </p:sp>
+      <p:sp>
+        <p:nvSpPr>
+          <p:cNvPr id="4" name="Espace réservé du numéro de diapositive 3"/>
+          <p:cNvSpPr>
+            <a:spLocks noGrp="1"/>
+          </p:cNvSpPr>
+          <p:nvPr>
+            <p:ph type="sldNum" sz="quarter" idx="10"/>
+          </p:nvPr>
+        </p:nvSpPr>
+        <p:spPr/>
+        <p:txBody>
+          <a:bodyPr/>
+          <a:lstStyle/>
+          <a:p>
+            <a:fld id="{98D6D126-DD00-4E45-94F1-6FDCCF5D6900}" type="slidenum">
+              <a:rPr lang="fr-FR" smtClean="0"/>
+              <a:t>8</a:t>
+            </a:fld>
+            <a:endParaRPr lang="fr-FR"/>
+          </a:p>
+        </p:txBody>
+      </p:sp>
+    </p:spTree>
+    <p:extLst>
+      <p:ext uri="{BB962C8B-B14F-4D97-AF65-F5344CB8AC3E}">
+        <p14:creationId xmlns:p14="http://schemas.microsoft.com/office/powerpoint/2010/main" val="3507853677"/>
+      </p:ext>
+    </p:extLst>
+  </p:cSld>
+  <p:clrMapOvr>
+    <a:masterClrMapping/>
+  </p:clrMapOvr>
+</p:notes>
+</file>
+
 <file path=ppt/slideLayouts/slideLayout1.xml><?xml version="1.0" encoding="utf-8"?>
 <p:sldLayout xmlns:a="http://schemas.openxmlformats.org/drawingml/2006/main" xmlns:r="http://schemas.openxmlformats.org/officeDocument/2006/relationships" xmlns:p="http://schemas.openxmlformats.org/presentationml/2006/main" type="title" preserve="1">
   <p:cSld name="Diapositive de titre">
@@ -252,7 +1904,7 @@
           <a:p>
             <a:fld id="{DF221B48-0990-4862-BF1D-CC5541F0AF30}" type="datetimeFigureOut">
               <a:rPr lang="fr-FR" smtClean="0"/>
-              <a:t>31/10/2018</a:t>
+              <a:t>21/11/2018</a:t>
             </a:fld>
             <a:endParaRPr lang="fr-FR"/>
           </a:p>
@@ -422,7 +2074,7 @@
           <a:p>
             <a:fld id="{DF221B48-0990-4862-BF1D-CC5541F0AF30}" type="datetimeFigureOut">
               <a:rPr lang="fr-FR" smtClean="0"/>
-              <a:t>31/10/2018</a:t>
+              <a:t>21/11/2018</a:t>
             </a:fld>
             <a:endParaRPr lang="fr-FR"/>
           </a:p>
@@ -602,7 +2254,7 @@
           <a:p>
             <a:fld id="{DF221B48-0990-4862-BF1D-CC5541F0AF30}" type="datetimeFigureOut">
               <a:rPr lang="fr-FR" smtClean="0"/>
-              <a:t>31/10/2018</a:t>
+              <a:t>21/11/2018</a:t>
             </a:fld>
             <a:endParaRPr lang="fr-FR"/>
           </a:p>
@@ -772,7 +2424,7 @@
           <a:p>
             <a:fld id="{DF221B48-0990-4862-BF1D-CC5541F0AF30}" type="datetimeFigureOut">
               <a:rPr lang="fr-FR" smtClean="0"/>
-              <a:t>31/10/2018</a:t>
+              <a:t>21/11/2018</a:t>
             </a:fld>
             <a:endParaRPr lang="fr-FR"/>
           </a:p>
@@ -1018,7 +2670,7 @@
           <a:p>
             <a:fld id="{DF221B48-0990-4862-BF1D-CC5541F0AF30}" type="datetimeFigureOut">
               <a:rPr lang="fr-FR" smtClean="0"/>
-              <a:t>31/10/2018</a:t>
+              <a:t>21/11/2018</a:t>
             </a:fld>
             <a:endParaRPr lang="fr-FR"/>
           </a:p>
@@ -1250,7 +2902,7 @@
           <a:p>
             <a:fld id="{DF221B48-0990-4862-BF1D-CC5541F0AF30}" type="datetimeFigureOut">
               <a:rPr lang="fr-FR" smtClean="0"/>
-              <a:t>31/10/2018</a:t>
+              <a:t>21/11/2018</a:t>
             </a:fld>
             <a:endParaRPr lang="fr-FR"/>
           </a:p>
@@ -1617,7 +3269,7 @@
           <a:p>
             <a:fld id="{DF221B48-0990-4862-BF1D-CC5541F0AF30}" type="datetimeFigureOut">
               <a:rPr lang="fr-FR" smtClean="0"/>
-              <a:t>31/10/2018</a:t>
+              <a:t>21/11/2018</a:t>
             </a:fld>
             <a:endParaRPr lang="fr-FR"/>
           </a:p>
@@ -1735,7 +3387,7 @@
           <a:p>
             <a:fld id="{DF221B48-0990-4862-BF1D-CC5541F0AF30}" type="datetimeFigureOut">
               <a:rPr lang="fr-FR" smtClean="0"/>
-              <a:t>31/10/2018</a:t>
+              <a:t>21/11/2018</a:t>
             </a:fld>
             <a:endParaRPr lang="fr-FR"/>
           </a:p>
@@ -1830,7 +3482,7 @@
           <a:p>
             <a:fld id="{DF221B48-0990-4862-BF1D-CC5541F0AF30}" type="datetimeFigureOut">
               <a:rPr lang="fr-FR" smtClean="0"/>
-              <a:t>31/10/2018</a:t>
+              <a:t>21/11/2018</a:t>
             </a:fld>
             <a:endParaRPr lang="fr-FR"/>
           </a:p>
@@ -2107,7 +3759,7 @@
           <a:p>
             <a:fld id="{DF221B48-0990-4862-BF1D-CC5541F0AF30}" type="datetimeFigureOut">
               <a:rPr lang="fr-FR" smtClean="0"/>
-              <a:t>31/10/2018</a:t>
+              <a:t>21/11/2018</a:t>
             </a:fld>
             <a:endParaRPr lang="fr-FR"/>
           </a:p>
@@ -2360,7 +4012,7 @@
           <a:p>
             <a:fld id="{DF221B48-0990-4862-BF1D-CC5541F0AF30}" type="datetimeFigureOut">
               <a:rPr lang="fr-FR" smtClean="0"/>
-              <a:t>31/10/2018</a:t>
+              <a:t>21/11/2018</a:t>
             </a:fld>
             <a:endParaRPr lang="fr-FR"/>
           </a:p>
@@ -2573,7 +4225,7 @@
           <a:p>
             <a:fld id="{DF221B48-0990-4862-BF1D-CC5541F0AF30}" type="datetimeFigureOut">
               <a:rPr lang="fr-FR" smtClean="0"/>
-              <a:t>31/10/2018</a:t>
+              <a:t>21/11/2018</a:t>
             </a:fld>
             <a:endParaRPr lang="fr-FR"/>
           </a:p>
@@ -2995,7 +4647,7 @@
           <p:nvPr/>
         </p:nvPicPr>
         <p:blipFill>
-          <a:blip r:embed="rId2">
+          <a:blip r:embed="rId3">
             <a:extLst>
               <a:ext uri="{28A0092B-C50C-407E-A947-70E740481C1C}">
                 <a14:useLocalDpi xmlns:a14="http://schemas.microsoft.com/office/drawing/2010/main" val="0"/>
@@ -3443,7 +5095,7 @@
           </p:nvPr>
         </p:nvPicPr>
         <p:blipFill>
-          <a:blip r:embed="rId2">
+          <a:blip r:embed="rId3">
             <a:extLst>
               <a:ext uri="{28A0092B-C50C-407E-A947-70E740481C1C}">
                 <a14:useLocalDpi xmlns:a14="http://schemas.microsoft.com/office/drawing/2010/main" val="0"/>
@@ -3544,7 +5196,7 @@
           </p:nvPr>
         </p:nvPicPr>
         <p:blipFill>
-          <a:blip r:embed="rId2">
+          <a:blip r:embed="rId3">
             <a:extLst>
               <a:ext uri="{28A0092B-C50C-407E-A947-70E740481C1C}">
                 <a14:useLocalDpi xmlns:a14="http://schemas.microsoft.com/office/drawing/2010/main" val="0"/>
@@ -3899,7 +5551,7 @@
           </p:nvPr>
         </p:nvPicPr>
         <p:blipFill>
-          <a:blip r:embed="rId2">
+          <a:blip r:embed="rId3">
             <a:extLst>
               <a:ext uri="{28A0092B-C50C-407E-A947-70E740481C1C}">
                 <a14:useLocalDpi xmlns:a14="http://schemas.microsoft.com/office/drawing/2010/main" val="0"/>
@@ -4007,7 +5659,7 @@
           </p:nvPr>
         </p:nvPicPr>
         <p:blipFill>
-          <a:blip r:embed="rId2">
+          <a:blip r:embed="rId3">
             <a:extLst>
               <a:ext uri="{28A0092B-C50C-407E-A947-70E740481C1C}">
                 <a14:useLocalDpi xmlns:a14="http://schemas.microsoft.com/office/drawing/2010/main" val="0"/>
@@ -4034,7 +5686,7 @@
           <p:nvPr/>
         </p:nvPicPr>
         <p:blipFill>
-          <a:blip r:embed="rId3">
+          <a:blip r:embed="rId4">
             <a:extLst>
               <a:ext uri="{28A0092B-C50C-407E-A947-70E740481C1C}">
                 <a14:useLocalDpi xmlns:a14="http://schemas.microsoft.com/office/drawing/2010/main" val="0"/>
@@ -4064,7 +5716,7 @@
           <p:nvPr/>
         </p:nvPicPr>
         <p:blipFill>
-          <a:blip r:embed="rId4">
+          <a:blip r:embed="rId5">
             <a:extLst>
               <a:ext uri="{28A0092B-C50C-407E-A947-70E740481C1C}">
                 <a14:useLocalDpi xmlns:a14="http://schemas.microsoft.com/office/drawing/2010/main" val="0"/>
@@ -4094,7 +5746,7 @@
           <p:nvPr/>
         </p:nvPicPr>
         <p:blipFill>
-          <a:blip r:embed="rId5">
+          <a:blip r:embed="rId6">
             <a:extLst>
               <a:ext uri="{28A0092B-C50C-407E-A947-70E740481C1C}">
                 <a14:useLocalDpi xmlns:a14="http://schemas.microsoft.com/office/drawing/2010/main" val="0"/>
@@ -4124,7 +5776,7 @@
           <p:nvPr/>
         </p:nvPicPr>
         <p:blipFill>
-          <a:blip r:embed="rId6">
+          <a:blip r:embed="rId7">
             <a:extLst>
               <a:ext uri="{28A0092B-C50C-407E-A947-70E740481C1C}">
                 <a14:useLocalDpi xmlns:a14="http://schemas.microsoft.com/office/drawing/2010/main" val="0"/>
@@ -4154,7 +5806,7 @@
           <p:nvPr/>
         </p:nvPicPr>
         <p:blipFill>
-          <a:blip r:embed="rId7">
+          <a:blip r:embed="rId8">
             <a:extLst>
               <a:ext uri="{28A0092B-C50C-407E-A947-70E740481C1C}">
                 <a14:useLocalDpi xmlns:a14="http://schemas.microsoft.com/office/drawing/2010/main" val="0"/>
@@ -4613,4 +6265,265 @@
     </a:ext>
   </a:extLst>
 </a:theme>
+</file>
+
+<file path=ppt/theme/theme2.xml><?xml version="1.0" encoding="utf-8"?>
+<a:theme xmlns:a="http://schemas.openxmlformats.org/drawingml/2006/main" name="Thème Office">
+  <a:themeElements>
+    <a:clrScheme name="Office">
+      <a:dk1>
+        <a:sysClr val="windowText" lastClr="000000"/>
+      </a:dk1>
+      <a:lt1>
+        <a:sysClr val="window" lastClr="FFFFFF"/>
+      </a:lt1>
+      <a:dk2>
+        <a:srgbClr val="44546A"/>
+      </a:dk2>
+      <a:lt2>
+        <a:srgbClr val="E7E6E6"/>
+      </a:lt2>
+      <a:accent1>
+        <a:srgbClr val="5B9BD5"/>
+      </a:accent1>
+      <a:accent2>
+        <a:srgbClr val="ED7D31"/>
+      </a:accent2>
+      <a:accent3>
+        <a:srgbClr val="A5A5A5"/>
+      </a:accent3>
+      <a:accent4>
+        <a:srgbClr val="FFC000"/>
+      </a:accent4>
+      <a:accent5>
+        <a:srgbClr val="4472C4"/>
+      </a:accent5>
+      <a:accent6>
+        <a:srgbClr val="70AD47"/>
+      </a:accent6>
+      <a:hlink>
+        <a:srgbClr val="0563C1"/>
+      </a:hlink>
+      <a:folHlink>
+        <a:srgbClr val="954F72"/>
+      </a:folHlink>
+    </a:clrScheme>
+    <a:fontScheme name="Office">
+      <a:majorFont>
+        <a:latin typeface="Calibri Light" panose="020F0302020204030204"/>
+        <a:ea typeface=""/>
+        <a:cs typeface=""/>
+        <a:font script="Jpan" typeface="ＭＳ Ｐゴシック"/>
+        <a:font script="Hang" typeface="맑은 고딕"/>
+        <a:font script="Hans" typeface="宋体"/>
+        <a:font script="Hant" typeface="新細明體"/>
+        <a:font script="Arab" typeface="Times New Roman"/>
+        <a:font script="Hebr" typeface="Times New Roman"/>
+        <a:font script="Thai" typeface="Angsana New"/>
+        <a:font script="Ethi" typeface="Nyala"/>
+        <a:font script="Beng" typeface="Vrinda"/>
+        <a:font script="Gujr" typeface="Shruti"/>
+        <a:font script="Khmr" typeface="MoolBoran"/>
+        <a:font script="Knda" typeface="Tunga"/>
+        <a:font script="Guru" typeface="Raavi"/>
+        <a:font script="Cans" typeface="Euphemia"/>
+        <a:font script="Cher" typeface="Plantagenet Cherokee"/>
+        <a:font script="Yiii" typeface="Microsoft Yi Baiti"/>
+        <a:font script="Tibt" typeface="Microsoft Himalaya"/>
+        <a:font script="Thaa" typeface="MV Boli"/>
+        <a:font script="Deva" typeface="Mangal"/>
+        <a:font script="Telu" typeface="Gautami"/>
+        <a:font script="Taml" typeface="Latha"/>
+        <a:font script="Syrc" typeface="Estrangelo Edessa"/>
+        <a:font script="Orya" typeface="Kalinga"/>
+        <a:font script="Mlym" typeface="Kartika"/>
+        <a:font script="Laoo" typeface="DokChampa"/>
+        <a:font script="Sinh" typeface="Iskoola Pota"/>
+        <a:font script="Mong" typeface="Mongolian Baiti"/>
+        <a:font script="Viet" typeface="Times New Roman"/>
+        <a:font script="Uigh" typeface="Microsoft Uighur"/>
+        <a:font script="Geor" typeface="Sylfaen"/>
+      </a:majorFont>
+      <a:minorFont>
+        <a:latin typeface="Calibri" panose="020F0502020204030204"/>
+        <a:ea typeface=""/>
+        <a:cs typeface=""/>
+        <a:font script="Jpan" typeface="ＭＳ Ｐゴシック"/>
+        <a:font script="Hang" typeface="맑은 고딕"/>
+        <a:font script="Hans" typeface="宋体"/>
+        <a:font script="Hant" typeface="新細明體"/>
+        <a:font script="Arab" typeface="Arial"/>
+        <a:font script="Hebr" typeface="Arial"/>
+        <a:font script="Thai" typeface="Cordia New"/>
+        <a:font script="Ethi" typeface="Nyala"/>
+        <a:font script="Beng" typeface="Vrinda"/>
+        <a:font script="Gujr" typeface="Shruti"/>
+        <a:font script="Khmr" typeface="DaunPenh"/>
+        <a:font script="Knda" typeface="Tunga"/>
+        <a:font script="Guru" typeface="Raavi"/>
+        <a:font script="Cans" typeface="Euphemia"/>
+        <a:font script="Cher" typeface="Plantagenet Cherokee"/>
+        <a:font script="Yiii" typeface="Microsoft Yi Baiti"/>
+        <a:font script="Tibt" typeface="Microsoft Himalaya"/>
+        <a:font script="Thaa" typeface="MV Boli"/>
+        <a:font script="Deva" typeface="Mangal"/>
+        <a:font script="Telu" typeface="Gautami"/>
+        <a:font script="Taml" typeface="Latha"/>
+        <a:font script="Syrc" typeface="Estrangelo Edessa"/>
+        <a:font script="Orya" typeface="Kalinga"/>
+        <a:font script="Mlym" typeface="Kartika"/>
+        <a:font script="Laoo" typeface="DokChampa"/>
+        <a:font script="Sinh" typeface="Iskoola Pota"/>
+        <a:font script="Mong" typeface="Mongolian Baiti"/>
+        <a:font script="Viet" typeface="Arial"/>
+        <a:font script="Uigh" typeface="Microsoft Uighur"/>
+        <a:font script="Geor" typeface="Sylfaen"/>
+      </a:minorFont>
+    </a:fontScheme>
+    <a:fmtScheme name="Office">
+      <a:fillStyleLst>
+        <a:solidFill>
+          <a:schemeClr val="phClr"/>
+        </a:solidFill>
+        <a:gradFill rotWithShape="1">
+          <a:gsLst>
+            <a:gs pos="0">
+              <a:schemeClr val="phClr">
+                <a:lumMod val="110000"/>
+                <a:satMod val="105000"/>
+                <a:tint val="67000"/>
+              </a:schemeClr>
+            </a:gs>
+            <a:gs pos="50000">
+              <a:schemeClr val="phClr">
+                <a:lumMod val="105000"/>
+                <a:satMod val="103000"/>
+                <a:tint val="73000"/>
+              </a:schemeClr>
+            </a:gs>
+            <a:gs pos="100000">
+              <a:schemeClr val="phClr">
+                <a:lumMod val="105000"/>
+                <a:satMod val="109000"/>
+                <a:tint val="81000"/>
+              </a:schemeClr>
+            </a:gs>
+          </a:gsLst>
+          <a:lin ang="5400000" scaled="0"/>
+        </a:gradFill>
+        <a:gradFill rotWithShape="1">
+          <a:gsLst>
+            <a:gs pos="0">
+              <a:schemeClr val="phClr">
+                <a:satMod val="103000"/>
+                <a:lumMod val="102000"/>
+                <a:tint val="94000"/>
+              </a:schemeClr>
+            </a:gs>
+            <a:gs pos="50000">
+              <a:schemeClr val="phClr">
+                <a:satMod val="110000"/>
+                <a:lumMod val="100000"/>
+                <a:shade val="100000"/>
+              </a:schemeClr>
+            </a:gs>
+            <a:gs pos="100000">
+              <a:schemeClr val="phClr">
+                <a:lumMod val="99000"/>
+                <a:satMod val="120000"/>
+                <a:shade val="78000"/>
+              </a:schemeClr>
+            </a:gs>
+          </a:gsLst>
+          <a:lin ang="5400000" scaled="0"/>
+        </a:gradFill>
+      </a:fillStyleLst>
+      <a:lnStyleLst>
+        <a:ln w="6350" cap="flat" cmpd="sng" algn="ctr">
+          <a:solidFill>
+            <a:schemeClr val="phClr"/>
+          </a:solidFill>
+          <a:prstDash val="solid"/>
+          <a:miter lim="800000"/>
+        </a:ln>
+        <a:ln w="12700" cap="flat" cmpd="sng" algn="ctr">
+          <a:solidFill>
+            <a:schemeClr val="phClr"/>
+          </a:solidFill>
+          <a:prstDash val="solid"/>
+          <a:miter lim="800000"/>
+        </a:ln>
+        <a:ln w="19050" cap="flat" cmpd="sng" algn="ctr">
+          <a:solidFill>
+            <a:schemeClr val="phClr"/>
+          </a:solidFill>
+          <a:prstDash val="solid"/>
+          <a:miter lim="800000"/>
+        </a:ln>
+      </a:lnStyleLst>
+      <a:effectStyleLst>
+        <a:effectStyle>
+          <a:effectLst/>
+        </a:effectStyle>
+        <a:effectStyle>
+          <a:effectLst/>
+        </a:effectStyle>
+        <a:effectStyle>
+          <a:effectLst>
+            <a:outerShdw blurRad="57150" dist="19050" dir="5400000" algn="ctr" rotWithShape="0">
+              <a:srgbClr val="000000">
+                <a:alpha val="63000"/>
+              </a:srgbClr>
+            </a:outerShdw>
+          </a:effectLst>
+        </a:effectStyle>
+      </a:effectStyleLst>
+      <a:bgFillStyleLst>
+        <a:solidFill>
+          <a:schemeClr val="phClr"/>
+        </a:solidFill>
+        <a:solidFill>
+          <a:schemeClr val="phClr">
+            <a:tint val="95000"/>
+            <a:satMod val="170000"/>
+          </a:schemeClr>
+        </a:solidFill>
+        <a:gradFill rotWithShape="1">
+          <a:gsLst>
+            <a:gs pos="0">
+              <a:schemeClr val="phClr">
+                <a:tint val="93000"/>
+                <a:satMod val="150000"/>
+                <a:shade val="98000"/>
+                <a:lumMod val="102000"/>
+              </a:schemeClr>
+            </a:gs>
+            <a:gs pos="50000">
+              <a:schemeClr val="phClr">
+                <a:tint val="98000"/>
+                <a:satMod val="130000"/>
+                <a:shade val="90000"/>
+                <a:lumMod val="103000"/>
+              </a:schemeClr>
+            </a:gs>
+            <a:gs pos="100000">
+              <a:schemeClr val="phClr">
+                <a:shade val="63000"/>
+                <a:satMod val="120000"/>
+              </a:schemeClr>
+            </a:gs>
+          </a:gsLst>
+          <a:lin ang="5400000" scaled="0"/>
+        </a:gradFill>
+      </a:bgFillStyleLst>
+    </a:fmtScheme>
+  </a:themeElements>
+  <a:objectDefaults/>
+  <a:extraClrSchemeLst/>
+  <a:extLst>
+    <a:ext uri="{05A4C25C-085E-4340-85A3-A5531E510DB2}">
+      <thm15:themeFamily xmlns:thm15="http://schemas.microsoft.com/office/thememl/2012/main" name="Office Theme" id="{62F939B6-93AF-4DB8-9C6B-D6C7DFDC589F}" vid="{4A3C46E8-61CC-4603-A589-7422A47A8E4A}"/>
+    </a:ext>
+  </a:extLst>
+</a:theme>
 </file>
</xml_diff>